<commit_message>
Updated servlets and views in pptx
</commit_message>
<xml_diff>
--- a/docs/TIWProjectSpangaroFerlin.pptx
+++ b/docs/TIWProjectSpangaroFerlin.pptx
@@ -13827,7 +13827,7 @@
         <p:spPr>
           <a:xfrm>
             <a:off x="7501180" y="1282615"/>
-            <a:ext cx="2929179" cy="1938992"/>
+            <a:ext cx="3257611" cy="3170099"/>
           </a:xfrm>
           <a:prstGeom prst="rect">
             <a:avLst/>
@@ -14047,6 +14047,231 @@
               </a:rPr>
               <a:t>OffersController</a:t>
             </a:r>
+            <a:endParaRPr lang="it-IT" sz="1400" dirty="0">
+              <a:solidFill>
+                <a:schemeClr val="tx1">
+                  <a:lumMod val="75000"/>
+                  <a:lumOff val="25000"/>
+                </a:schemeClr>
+              </a:solidFill>
+              <a:latin typeface="Times New Roman" panose="02020603050405020304" pitchFamily="18" charset="0"/>
+              <a:cs typeface="Times New Roman" panose="02020603050405020304" pitchFamily="18" charset="0"/>
+            </a:endParaRPr>
+          </a:p>
+          <a:p>
+            <a:pPr marL="285750" indent="-285750">
+              <a:buClr>
+                <a:schemeClr val="accent1">
+                  <a:lumMod val="75000"/>
+                </a:schemeClr>
+              </a:buClr>
+              <a:buFont typeface="Arial" panose="020B0604020202020204" pitchFamily="34" charset="0"/>
+              <a:buChar char="•"/>
+            </a:pPr>
+            <a:endParaRPr lang="it-IT" sz="1400" dirty="0">
+              <a:solidFill>
+                <a:schemeClr val="tx1">
+                  <a:lumMod val="75000"/>
+                  <a:lumOff val="25000"/>
+                </a:schemeClr>
+              </a:solidFill>
+              <a:latin typeface="Times New Roman" panose="02020603050405020304" pitchFamily="18" charset="0"/>
+              <a:cs typeface="Times New Roman" panose="02020603050405020304" pitchFamily="18" charset="0"/>
+            </a:endParaRPr>
+          </a:p>
+          <a:p>
+            <a:pPr marL="285750" indent="-285750">
+              <a:buClr>
+                <a:schemeClr val="accent1">
+                  <a:lumMod val="75000"/>
+                </a:schemeClr>
+              </a:buClr>
+              <a:buFont typeface="Arial" panose="020B0604020202020204" pitchFamily="34" charset="0"/>
+              <a:buChar char="•"/>
+            </a:pPr>
+            <a:r>
+              <a:rPr lang="it-IT" sz="1400" dirty="0" err="1">
+                <a:solidFill>
+                  <a:schemeClr val="tx1">
+                    <a:lumMod val="75000"/>
+                    <a:lumOff val="25000"/>
+                  </a:schemeClr>
+                </a:solidFill>
+                <a:latin typeface="Times New Roman" panose="02020603050405020304" pitchFamily="18" charset="0"/>
+                <a:cs typeface="Times New Roman" panose="02020603050405020304" pitchFamily="18" charset="0"/>
+              </a:rPr>
+              <a:t>AuctionDetailsPage</a:t>
+            </a:r>
+            <a:endParaRPr lang="it-IT" sz="1400" dirty="0">
+              <a:solidFill>
+                <a:schemeClr val="tx1">
+                  <a:lumMod val="75000"/>
+                  <a:lumOff val="25000"/>
+                </a:schemeClr>
+              </a:solidFill>
+              <a:latin typeface="Times New Roman" panose="02020603050405020304" pitchFamily="18" charset="0"/>
+              <a:cs typeface="Times New Roman" panose="02020603050405020304" pitchFamily="18" charset="0"/>
+            </a:endParaRPr>
+          </a:p>
+          <a:p>
+            <a:pPr marL="285750" indent="-285750">
+              <a:buClr>
+                <a:schemeClr val="accent1">
+                  <a:lumMod val="75000"/>
+                </a:schemeClr>
+              </a:buClr>
+              <a:buFont typeface="Arial" panose="020B0604020202020204" pitchFamily="34" charset="0"/>
+              <a:buChar char="•"/>
+            </a:pPr>
+            <a:r>
+              <a:rPr lang="it-IT" sz="1400" dirty="0" err="1">
+                <a:solidFill>
+                  <a:schemeClr val="tx1">
+                    <a:lumMod val="75000"/>
+                    <a:lumOff val="25000"/>
+                  </a:schemeClr>
+                </a:solidFill>
+                <a:latin typeface="Times New Roman" panose="02020603050405020304" pitchFamily="18" charset="0"/>
+                <a:cs typeface="Times New Roman" panose="02020603050405020304" pitchFamily="18" charset="0"/>
+              </a:rPr>
+              <a:t>BuyPage</a:t>
+            </a:r>
+            <a:endParaRPr lang="it-IT" sz="1400" dirty="0">
+              <a:solidFill>
+                <a:schemeClr val="tx1">
+                  <a:lumMod val="75000"/>
+                  <a:lumOff val="25000"/>
+                </a:schemeClr>
+              </a:solidFill>
+              <a:latin typeface="Times New Roman" panose="02020603050405020304" pitchFamily="18" charset="0"/>
+              <a:cs typeface="Times New Roman" panose="02020603050405020304" pitchFamily="18" charset="0"/>
+            </a:endParaRPr>
+          </a:p>
+          <a:p>
+            <a:pPr marL="285750" indent="-285750">
+              <a:buClr>
+                <a:schemeClr val="accent1">
+                  <a:lumMod val="75000"/>
+                </a:schemeClr>
+              </a:buClr>
+              <a:buFont typeface="Arial" panose="020B0604020202020204" pitchFamily="34" charset="0"/>
+              <a:buChar char="•"/>
+            </a:pPr>
+            <a:r>
+              <a:rPr lang="it-IT" sz="1400" dirty="0" err="1">
+                <a:solidFill>
+                  <a:schemeClr val="tx1">
+                    <a:lumMod val="75000"/>
+                    <a:lumOff val="25000"/>
+                  </a:schemeClr>
+                </a:solidFill>
+                <a:latin typeface="Times New Roman" panose="02020603050405020304" pitchFamily="18" charset="0"/>
+                <a:cs typeface="Times New Roman" panose="02020603050405020304" pitchFamily="18" charset="0"/>
+              </a:rPr>
+              <a:t>HomePage</a:t>
+            </a:r>
+            <a:endParaRPr lang="it-IT" sz="1400" dirty="0">
+              <a:solidFill>
+                <a:schemeClr val="tx1">
+                  <a:lumMod val="75000"/>
+                  <a:lumOff val="25000"/>
+                </a:schemeClr>
+              </a:solidFill>
+              <a:latin typeface="Times New Roman" panose="02020603050405020304" pitchFamily="18" charset="0"/>
+              <a:cs typeface="Times New Roman" panose="02020603050405020304" pitchFamily="18" charset="0"/>
+            </a:endParaRPr>
+          </a:p>
+          <a:p>
+            <a:pPr marL="285750" indent="-285750">
+              <a:buClr>
+                <a:schemeClr val="accent1">
+                  <a:lumMod val="75000"/>
+                </a:schemeClr>
+              </a:buClr>
+              <a:buFont typeface="Arial" panose="020B0604020202020204" pitchFamily="34" charset="0"/>
+              <a:buChar char="•"/>
+            </a:pPr>
+            <a:r>
+              <a:rPr lang="it-IT" sz="1400" dirty="0" err="1">
+                <a:solidFill>
+                  <a:schemeClr val="tx1">
+                    <a:lumMod val="75000"/>
+                    <a:lumOff val="25000"/>
+                  </a:schemeClr>
+                </a:solidFill>
+                <a:latin typeface="Times New Roman" panose="02020603050405020304" pitchFamily="18" charset="0"/>
+                <a:cs typeface="Times New Roman" panose="02020603050405020304" pitchFamily="18" charset="0"/>
+              </a:rPr>
+              <a:t>LoginPage</a:t>
+            </a:r>
+            <a:endParaRPr lang="it-IT" sz="1400" dirty="0">
+              <a:solidFill>
+                <a:schemeClr val="tx1">
+                  <a:lumMod val="75000"/>
+                  <a:lumOff val="25000"/>
+                </a:schemeClr>
+              </a:solidFill>
+              <a:latin typeface="Times New Roman" panose="02020603050405020304" pitchFamily="18" charset="0"/>
+              <a:cs typeface="Times New Roman" panose="02020603050405020304" pitchFamily="18" charset="0"/>
+            </a:endParaRPr>
+          </a:p>
+          <a:p>
+            <a:pPr marL="285750" indent="-285750">
+              <a:buClr>
+                <a:schemeClr val="accent1">
+                  <a:lumMod val="75000"/>
+                </a:schemeClr>
+              </a:buClr>
+              <a:buFont typeface="Arial" panose="020B0604020202020204" pitchFamily="34" charset="0"/>
+              <a:buChar char="•"/>
+            </a:pPr>
+            <a:r>
+              <a:rPr lang="it-IT" sz="1400" dirty="0" err="1">
+                <a:solidFill>
+                  <a:schemeClr val="tx1">
+                    <a:lumMod val="75000"/>
+                    <a:lumOff val="25000"/>
+                  </a:schemeClr>
+                </a:solidFill>
+                <a:latin typeface="Times New Roman" panose="02020603050405020304" pitchFamily="18" charset="0"/>
+                <a:cs typeface="Times New Roman" panose="02020603050405020304" pitchFamily="18" charset="0"/>
+              </a:rPr>
+              <a:t>OffersPage</a:t>
+            </a:r>
+            <a:endParaRPr lang="it-IT" sz="1400" dirty="0">
+              <a:solidFill>
+                <a:schemeClr val="tx1">
+                  <a:lumMod val="75000"/>
+                  <a:lumOff val="25000"/>
+                </a:schemeClr>
+              </a:solidFill>
+              <a:latin typeface="Times New Roman" panose="02020603050405020304" pitchFamily="18" charset="0"/>
+              <a:cs typeface="Times New Roman" panose="02020603050405020304" pitchFamily="18" charset="0"/>
+            </a:endParaRPr>
+          </a:p>
+          <a:p>
+            <a:pPr marL="285750" indent="-285750">
+              <a:buClr>
+                <a:schemeClr val="accent1">
+                  <a:lumMod val="75000"/>
+                </a:schemeClr>
+              </a:buClr>
+              <a:buFont typeface="Arial" panose="020B0604020202020204" pitchFamily="34" charset="0"/>
+              <a:buChar char="•"/>
+            </a:pPr>
+            <a:r>
+              <a:rPr lang="it-IT" sz="1400" dirty="0" err="1">
+                <a:solidFill>
+                  <a:schemeClr val="tx1">
+                    <a:lumMod val="75000"/>
+                    <a:lumOff val="25000"/>
+                  </a:schemeClr>
+                </a:solidFill>
+                <a:latin typeface="Times New Roman" panose="02020603050405020304" pitchFamily="18" charset="0"/>
+                <a:cs typeface="Times New Roman" panose="02020603050405020304" pitchFamily="18" charset="0"/>
+              </a:rPr>
+              <a:t>SellPage</a:t>
+            </a:r>
             <a:endParaRPr lang="en-US" sz="1400" dirty="0">
               <a:solidFill>
                 <a:schemeClr val="tx1">
@@ -14057,9 +14282,6 @@
               <a:latin typeface="Times New Roman" panose="02020603050405020304" pitchFamily="18" charset="0"/>
               <a:cs typeface="Times New Roman" panose="02020603050405020304" pitchFamily="18" charset="0"/>
             </a:endParaRPr>
-          </a:p>
-          <a:p>
-            <a:endParaRPr lang="en-US" dirty="0"/>
           </a:p>
         </p:txBody>
       </p:sp>
@@ -15363,7 +15585,7 @@
         </p:nvSpPr>
         <p:spPr>
           <a:xfrm>
-            <a:off x="7501180" y="1282615"/>
+            <a:off x="4975668" y="3603189"/>
             <a:ext cx="2929179" cy="2369880"/>
           </a:xfrm>
           <a:prstGeom prst="rect">
@@ -15664,6 +15886,1386 @@
             </a:endParaRPr>
           </a:p>
           <a:p>
+            <a:endParaRPr lang="en-US" dirty="0"/>
+          </a:p>
+        </p:txBody>
+      </p:sp>
+      <p:sp>
+        <p:nvSpPr>
+          <p:cNvPr id="7" name="CasellaDiTesto 6">
+            <a:extLst>
+              <a:ext uri="{FF2B5EF4-FFF2-40B4-BE49-F238E27FC236}">
+                <a16:creationId xmlns:a16="http://schemas.microsoft.com/office/drawing/2014/main" id="{7405B8F2-86C0-DFCC-7B17-26C324B97418}"/>
+              </a:ext>
+            </a:extLst>
+          </p:cNvPr>
+          <p:cNvSpPr txBox="1"/>
+          <p:nvPr/>
+        </p:nvSpPr>
+        <p:spPr>
+          <a:xfrm>
+            <a:off x="7294538" y="335996"/>
+            <a:ext cx="3244153" cy="6350456"/>
+          </a:xfrm>
+          <a:prstGeom prst="rect">
+            <a:avLst/>
+          </a:prstGeom>
+          <a:noFill/>
+        </p:spPr>
+        <p:txBody>
+          <a:bodyPr wrap="square" rtlCol="0">
+            <a:spAutoFit/>
+          </a:bodyPr>
+          <a:lstStyle/>
+          <a:p>
+            <a:r>
+              <a:rPr lang="it-IT" sz="1400" dirty="0" err="1">
+                <a:solidFill>
+                  <a:schemeClr val="accent1"/>
+                </a:solidFill>
+                <a:latin typeface="Times New Roman" panose="02020603050405020304" pitchFamily="18" charset="0"/>
+                <a:ea typeface="+mj-ea"/>
+                <a:cs typeface="Times New Roman" panose="02020603050405020304" pitchFamily="18" charset="0"/>
+              </a:rPr>
+              <a:t>Views</a:t>
+            </a:r>
+            <a:r>
+              <a:rPr lang="it-IT" sz="1400" dirty="0">
+                <a:solidFill>
+                  <a:schemeClr val="accent1"/>
+                </a:solidFill>
+                <a:latin typeface="Times New Roman" panose="02020603050405020304" pitchFamily="18" charset="0"/>
+                <a:ea typeface="+mj-ea"/>
+                <a:cs typeface="Times New Roman" panose="02020603050405020304" pitchFamily="18" charset="0"/>
+              </a:rPr>
+              <a:t> &amp; </a:t>
+            </a:r>
+            <a:r>
+              <a:rPr lang="it-IT" sz="1400" dirty="0" err="1">
+                <a:solidFill>
+                  <a:schemeClr val="accent1"/>
+                </a:solidFill>
+                <a:latin typeface="Times New Roman" panose="02020603050405020304" pitchFamily="18" charset="0"/>
+                <a:ea typeface="+mj-ea"/>
+                <a:cs typeface="Times New Roman" panose="02020603050405020304" pitchFamily="18" charset="0"/>
+              </a:rPr>
+              <a:t>view</a:t>
+            </a:r>
+            <a:r>
+              <a:rPr lang="it-IT" sz="1400" dirty="0">
+                <a:solidFill>
+                  <a:schemeClr val="accent1"/>
+                </a:solidFill>
+                <a:latin typeface="Times New Roman" panose="02020603050405020304" pitchFamily="18" charset="0"/>
+                <a:ea typeface="+mj-ea"/>
+                <a:cs typeface="Times New Roman" panose="02020603050405020304" pitchFamily="18" charset="0"/>
+              </a:rPr>
+              <a:t> </a:t>
+            </a:r>
+            <a:r>
+              <a:rPr lang="it-IT" sz="1400" dirty="0" err="1">
+                <a:solidFill>
+                  <a:schemeClr val="accent1"/>
+                </a:solidFill>
+                <a:latin typeface="Times New Roman" panose="02020603050405020304" pitchFamily="18" charset="0"/>
+                <a:ea typeface="+mj-ea"/>
+                <a:cs typeface="Times New Roman" panose="02020603050405020304" pitchFamily="18" charset="0"/>
+              </a:rPr>
+              <a:t>components</a:t>
+            </a:r>
+            <a:endParaRPr lang="it-IT" sz="900" dirty="0">
+              <a:solidFill>
+                <a:schemeClr val="tx1">
+                  <a:lumMod val="75000"/>
+                  <a:lumOff val="25000"/>
+                </a:schemeClr>
+              </a:solidFill>
+              <a:latin typeface="Times New Roman" panose="02020603050405020304" pitchFamily="18" charset="0"/>
+              <a:cs typeface="Times New Roman" panose="02020603050405020304" pitchFamily="18" charset="0"/>
+            </a:endParaRPr>
+          </a:p>
+          <a:p>
+            <a:pPr marL="285750" indent="-285750">
+              <a:buClr>
+                <a:schemeClr val="accent1">
+                  <a:lumMod val="75000"/>
+                </a:schemeClr>
+              </a:buClr>
+              <a:buFont typeface="Arial" panose="020B0604020202020204" pitchFamily="34" charset="0"/>
+              <a:buChar char="•"/>
+            </a:pPr>
+            <a:r>
+              <a:rPr lang="it-IT" sz="1400" dirty="0">
+                <a:solidFill>
+                  <a:schemeClr val="tx1">
+                    <a:lumMod val="75000"/>
+                    <a:lumOff val="25000"/>
+                  </a:schemeClr>
+                </a:solidFill>
+                <a:latin typeface="Times New Roman" panose="02020603050405020304" pitchFamily="18" charset="0"/>
+                <a:cs typeface="Times New Roman" panose="02020603050405020304" pitchFamily="18" charset="0"/>
+              </a:rPr>
+              <a:t>router</a:t>
+            </a:r>
+          </a:p>
+          <a:p>
+            <a:pPr marL="742950" lvl="1" indent="-285750">
+              <a:buClr>
+                <a:schemeClr val="accent1">
+                  <a:lumMod val="75000"/>
+                </a:schemeClr>
+              </a:buClr>
+              <a:buFont typeface="Arial" panose="020B0604020202020204" pitchFamily="34" charset="0"/>
+              <a:buChar char="•"/>
+            </a:pPr>
+            <a:r>
+              <a:rPr lang="it-IT" sz="1200" dirty="0">
+                <a:solidFill>
+                  <a:schemeClr val="tx1">
+                    <a:lumMod val="75000"/>
+                    <a:lumOff val="25000"/>
+                  </a:schemeClr>
+                </a:solidFill>
+                <a:latin typeface="Times New Roman" panose="02020603050405020304" pitchFamily="18" charset="0"/>
+                <a:cs typeface="Times New Roman" panose="02020603050405020304" pitchFamily="18" charset="0"/>
+              </a:rPr>
+              <a:t>set(Page, </a:t>
+            </a:r>
+            <a:r>
+              <a:rPr lang="it-IT" sz="1200" dirty="0" err="1">
+                <a:solidFill>
+                  <a:schemeClr val="tx1">
+                    <a:lumMod val="75000"/>
+                    <a:lumOff val="25000"/>
+                  </a:schemeClr>
+                </a:solidFill>
+                <a:latin typeface="Times New Roman" panose="02020603050405020304" pitchFamily="18" charset="0"/>
+                <a:cs typeface="Times New Roman" panose="02020603050405020304" pitchFamily="18" charset="0"/>
+              </a:rPr>
+              <a:t>args</a:t>
+            </a:r>
+            <a:r>
+              <a:rPr lang="it-IT" sz="1200" dirty="0">
+                <a:solidFill>
+                  <a:schemeClr val="tx1">
+                    <a:lumMod val="75000"/>
+                    <a:lumOff val="25000"/>
+                  </a:schemeClr>
+                </a:solidFill>
+                <a:latin typeface="Times New Roman" panose="02020603050405020304" pitchFamily="18" charset="0"/>
+                <a:cs typeface="Times New Roman" panose="02020603050405020304" pitchFamily="18" charset="0"/>
+              </a:rPr>
+              <a:t>?)</a:t>
+            </a:r>
+          </a:p>
+          <a:p>
+            <a:pPr marL="742950" lvl="1" indent="-285750">
+              <a:buClr>
+                <a:schemeClr val="accent1">
+                  <a:lumMod val="75000"/>
+                </a:schemeClr>
+              </a:buClr>
+              <a:buFont typeface="Arial" panose="020B0604020202020204" pitchFamily="34" charset="0"/>
+              <a:buChar char="•"/>
+            </a:pPr>
+            <a:r>
+              <a:rPr lang="it-IT" sz="1200" dirty="0" err="1">
+                <a:solidFill>
+                  <a:schemeClr val="tx1">
+                    <a:lumMod val="75000"/>
+                    <a:lumOff val="25000"/>
+                  </a:schemeClr>
+                </a:solidFill>
+                <a:latin typeface="Times New Roman" panose="02020603050405020304" pitchFamily="18" charset="0"/>
+                <a:cs typeface="Times New Roman" panose="02020603050405020304" pitchFamily="18" charset="0"/>
+              </a:rPr>
+              <a:t>setById</a:t>
+            </a:r>
+            <a:r>
+              <a:rPr lang="it-IT" sz="1200" dirty="0">
+                <a:solidFill>
+                  <a:schemeClr val="tx1">
+                    <a:lumMod val="75000"/>
+                    <a:lumOff val="25000"/>
+                  </a:schemeClr>
+                </a:solidFill>
+                <a:latin typeface="Times New Roman" panose="02020603050405020304" pitchFamily="18" charset="0"/>
+                <a:cs typeface="Times New Roman" panose="02020603050405020304" pitchFamily="18" charset="0"/>
+              </a:rPr>
+              <a:t>(</a:t>
+            </a:r>
+            <a:r>
+              <a:rPr lang="it-IT" sz="1200" dirty="0" err="1">
+                <a:solidFill>
+                  <a:schemeClr val="tx1">
+                    <a:lumMod val="75000"/>
+                    <a:lumOff val="25000"/>
+                  </a:schemeClr>
+                </a:solidFill>
+                <a:latin typeface="Times New Roman" panose="02020603050405020304" pitchFamily="18" charset="0"/>
+                <a:cs typeface="Times New Roman" panose="02020603050405020304" pitchFamily="18" charset="0"/>
+              </a:rPr>
+              <a:t>pageId</a:t>
+            </a:r>
+            <a:r>
+              <a:rPr lang="it-IT" sz="1200" dirty="0">
+                <a:solidFill>
+                  <a:schemeClr val="tx1">
+                    <a:lumMod val="75000"/>
+                    <a:lumOff val="25000"/>
+                  </a:schemeClr>
+                </a:solidFill>
+                <a:latin typeface="Times New Roman" panose="02020603050405020304" pitchFamily="18" charset="0"/>
+                <a:cs typeface="Times New Roman" panose="02020603050405020304" pitchFamily="18" charset="0"/>
+              </a:rPr>
+              <a:t>: </a:t>
+            </a:r>
+            <a:r>
+              <a:rPr lang="it-IT" sz="1200" dirty="0" err="1">
+                <a:solidFill>
+                  <a:schemeClr val="tx1">
+                    <a:lumMod val="75000"/>
+                    <a:lumOff val="25000"/>
+                  </a:schemeClr>
+                </a:solidFill>
+                <a:latin typeface="Times New Roman" panose="02020603050405020304" pitchFamily="18" charset="0"/>
+                <a:cs typeface="Times New Roman" panose="02020603050405020304" pitchFamily="18" charset="0"/>
+              </a:rPr>
+              <a:t>string</a:t>
+            </a:r>
+            <a:r>
+              <a:rPr lang="it-IT" sz="1200" dirty="0">
+                <a:solidFill>
+                  <a:schemeClr val="tx1">
+                    <a:lumMod val="75000"/>
+                    <a:lumOff val="25000"/>
+                  </a:schemeClr>
+                </a:solidFill>
+                <a:latin typeface="Times New Roman" panose="02020603050405020304" pitchFamily="18" charset="0"/>
+                <a:cs typeface="Times New Roman" panose="02020603050405020304" pitchFamily="18" charset="0"/>
+              </a:rPr>
+              <a:t>, </a:t>
+            </a:r>
+            <a:r>
+              <a:rPr lang="it-IT" sz="1200" dirty="0" err="1">
+                <a:solidFill>
+                  <a:schemeClr val="tx1">
+                    <a:lumMod val="75000"/>
+                    <a:lumOff val="25000"/>
+                  </a:schemeClr>
+                </a:solidFill>
+                <a:latin typeface="Times New Roman" panose="02020603050405020304" pitchFamily="18" charset="0"/>
+                <a:cs typeface="Times New Roman" panose="02020603050405020304" pitchFamily="18" charset="0"/>
+              </a:rPr>
+              <a:t>args</a:t>
+            </a:r>
+            <a:r>
+              <a:rPr lang="it-IT" sz="1200" dirty="0">
+                <a:solidFill>
+                  <a:schemeClr val="tx1">
+                    <a:lumMod val="75000"/>
+                    <a:lumOff val="25000"/>
+                  </a:schemeClr>
+                </a:solidFill>
+                <a:latin typeface="Times New Roman" panose="02020603050405020304" pitchFamily="18" charset="0"/>
+                <a:cs typeface="Times New Roman" panose="02020603050405020304" pitchFamily="18" charset="0"/>
+              </a:rPr>
+              <a:t>?)</a:t>
+            </a:r>
+          </a:p>
+          <a:p>
+            <a:pPr marL="742950" lvl="1" indent="-285750">
+              <a:buClr>
+                <a:schemeClr val="accent1">
+                  <a:lumMod val="75000"/>
+                </a:schemeClr>
+              </a:buClr>
+              <a:buFont typeface="Arial" panose="020B0604020202020204" pitchFamily="34" charset="0"/>
+              <a:buChar char="•"/>
+            </a:pPr>
+            <a:r>
+              <a:rPr lang="it-IT" sz="1200" dirty="0" err="1">
+                <a:solidFill>
+                  <a:schemeClr val="tx1">
+                    <a:lumMod val="75000"/>
+                    <a:lumOff val="25000"/>
+                  </a:schemeClr>
+                </a:solidFill>
+                <a:latin typeface="Times New Roman" panose="02020603050405020304" pitchFamily="18" charset="0"/>
+                <a:cs typeface="Times New Roman" panose="02020603050405020304" pitchFamily="18" charset="0"/>
+              </a:rPr>
+              <a:t>get</a:t>
+            </a:r>
+            <a:r>
+              <a:rPr lang="it-IT" sz="1200" dirty="0">
+                <a:solidFill>
+                  <a:schemeClr val="tx1">
+                    <a:lumMod val="75000"/>
+                    <a:lumOff val="25000"/>
+                  </a:schemeClr>
+                </a:solidFill>
+                <a:latin typeface="Times New Roman" panose="02020603050405020304" pitchFamily="18" charset="0"/>
+                <a:cs typeface="Times New Roman" panose="02020603050405020304" pitchFamily="18" charset="0"/>
+              </a:rPr>
+              <a:t>() : Page</a:t>
+            </a:r>
+          </a:p>
+          <a:p>
+            <a:pPr marL="742950" lvl="1" indent="-285750">
+              <a:buClr>
+                <a:schemeClr val="accent1">
+                  <a:lumMod val="75000"/>
+                </a:schemeClr>
+              </a:buClr>
+              <a:buFont typeface="Arial" panose="020B0604020202020204" pitchFamily="34" charset="0"/>
+              <a:buChar char="•"/>
+            </a:pPr>
+            <a:r>
+              <a:rPr lang="it-IT" sz="1200" dirty="0" err="1">
+                <a:solidFill>
+                  <a:schemeClr val="tx1">
+                    <a:lumMod val="75000"/>
+                    <a:lumOff val="25000"/>
+                  </a:schemeClr>
+                </a:solidFill>
+                <a:latin typeface="Times New Roman" panose="02020603050405020304" pitchFamily="18" charset="0"/>
+                <a:cs typeface="Times New Roman" panose="02020603050405020304" pitchFamily="18" charset="0"/>
+              </a:rPr>
+              <a:t>isHomePage</a:t>
+            </a:r>
+            <a:r>
+              <a:rPr lang="it-IT" sz="1200" dirty="0">
+                <a:solidFill>
+                  <a:schemeClr val="tx1">
+                    <a:lumMod val="75000"/>
+                    <a:lumOff val="25000"/>
+                  </a:schemeClr>
+                </a:solidFill>
+                <a:latin typeface="Times New Roman" panose="02020603050405020304" pitchFamily="18" charset="0"/>
+                <a:cs typeface="Times New Roman" panose="02020603050405020304" pitchFamily="18" charset="0"/>
+              </a:rPr>
+              <a:t>() : </a:t>
+            </a:r>
+            <a:r>
+              <a:rPr lang="it-IT" sz="1200" dirty="0" err="1">
+                <a:solidFill>
+                  <a:schemeClr val="tx1">
+                    <a:lumMod val="75000"/>
+                    <a:lumOff val="25000"/>
+                  </a:schemeClr>
+                </a:solidFill>
+                <a:latin typeface="Times New Roman" panose="02020603050405020304" pitchFamily="18" charset="0"/>
+                <a:cs typeface="Times New Roman" panose="02020603050405020304" pitchFamily="18" charset="0"/>
+              </a:rPr>
+              <a:t>boolean</a:t>
+            </a:r>
+            <a:endParaRPr lang="it-IT" sz="1200" dirty="0">
+              <a:solidFill>
+                <a:schemeClr val="tx1">
+                  <a:lumMod val="75000"/>
+                  <a:lumOff val="25000"/>
+                </a:schemeClr>
+              </a:solidFill>
+              <a:latin typeface="Times New Roman" panose="02020603050405020304" pitchFamily="18" charset="0"/>
+              <a:cs typeface="Times New Roman" panose="02020603050405020304" pitchFamily="18" charset="0"/>
+            </a:endParaRPr>
+          </a:p>
+          <a:p>
+            <a:pPr marL="285750" indent="-285750">
+              <a:buClr>
+                <a:schemeClr val="accent1">
+                  <a:lumMod val="75000"/>
+                </a:schemeClr>
+              </a:buClr>
+              <a:buFont typeface="Arial" panose="020B0604020202020204" pitchFamily="34" charset="0"/>
+              <a:buChar char="•"/>
+            </a:pPr>
+            <a:r>
+              <a:rPr lang="it-IT" sz="1400" dirty="0" err="1">
+                <a:solidFill>
+                  <a:schemeClr val="tx1">
+                    <a:lumMod val="75000"/>
+                    <a:lumOff val="25000"/>
+                  </a:schemeClr>
+                </a:solidFill>
+                <a:latin typeface="Times New Roman" panose="02020603050405020304" pitchFamily="18" charset="0"/>
+                <a:cs typeface="Times New Roman" panose="02020603050405020304" pitchFamily="18" charset="0"/>
+              </a:rPr>
+              <a:t>buyPage</a:t>
+            </a:r>
+            <a:r>
+              <a:rPr lang="it-IT" sz="1400" dirty="0">
+                <a:solidFill>
+                  <a:schemeClr val="tx1">
+                    <a:lumMod val="75000"/>
+                    <a:lumOff val="25000"/>
+                  </a:schemeClr>
+                </a:solidFill>
+                <a:latin typeface="Times New Roman" panose="02020603050405020304" pitchFamily="18" charset="0"/>
+                <a:cs typeface="Times New Roman" panose="02020603050405020304" pitchFamily="18" charset="0"/>
+              </a:rPr>
+              <a:t> : Page</a:t>
+            </a:r>
+          </a:p>
+          <a:p>
+            <a:pPr marL="285750" indent="-285750">
+              <a:buClr>
+                <a:schemeClr val="accent1">
+                  <a:lumMod val="75000"/>
+                </a:schemeClr>
+              </a:buClr>
+              <a:buFont typeface="Arial" panose="020B0604020202020204" pitchFamily="34" charset="0"/>
+              <a:buChar char="•"/>
+            </a:pPr>
+            <a:r>
+              <a:rPr lang="it-IT" sz="1400" dirty="0" err="1">
+                <a:solidFill>
+                  <a:schemeClr val="tx1">
+                    <a:lumMod val="75000"/>
+                    <a:lumOff val="25000"/>
+                  </a:schemeClr>
+                </a:solidFill>
+                <a:latin typeface="Times New Roman" panose="02020603050405020304" pitchFamily="18" charset="0"/>
+                <a:cs typeface="Times New Roman" panose="02020603050405020304" pitchFamily="18" charset="0"/>
+              </a:rPr>
+              <a:t>sellPage</a:t>
+            </a:r>
+            <a:r>
+              <a:rPr lang="it-IT" sz="1400" dirty="0">
+                <a:solidFill>
+                  <a:schemeClr val="tx1">
+                    <a:lumMod val="75000"/>
+                    <a:lumOff val="25000"/>
+                  </a:schemeClr>
+                </a:solidFill>
+                <a:latin typeface="Times New Roman" panose="02020603050405020304" pitchFamily="18" charset="0"/>
+                <a:cs typeface="Times New Roman" panose="02020603050405020304" pitchFamily="18" charset="0"/>
+              </a:rPr>
+              <a:t> : Page</a:t>
+            </a:r>
+          </a:p>
+          <a:p>
+            <a:pPr marL="285750" indent="-285750">
+              <a:buClr>
+                <a:schemeClr val="accent1">
+                  <a:lumMod val="75000"/>
+                </a:schemeClr>
+              </a:buClr>
+              <a:buFont typeface="Arial" panose="020B0604020202020204" pitchFamily="34" charset="0"/>
+              <a:buChar char="•"/>
+            </a:pPr>
+            <a:r>
+              <a:rPr lang="it-IT" sz="1400" dirty="0" err="1">
+                <a:solidFill>
+                  <a:schemeClr val="tx1">
+                    <a:lumMod val="75000"/>
+                    <a:lumOff val="25000"/>
+                  </a:schemeClr>
+                </a:solidFill>
+                <a:latin typeface="Times New Roman" panose="02020603050405020304" pitchFamily="18" charset="0"/>
+                <a:cs typeface="Times New Roman" panose="02020603050405020304" pitchFamily="18" charset="0"/>
+              </a:rPr>
+              <a:t>auctionDetailsPage</a:t>
+            </a:r>
+            <a:r>
+              <a:rPr lang="it-IT" sz="1400" dirty="0">
+                <a:solidFill>
+                  <a:schemeClr val="tx1">
+                    <a:lumMod val="75000"/>
+                    <a:lumOff val="25000"/>
+                  </a:schemeClr>
+                </a:solidFill>
+                <a:latin typeface="Times New Roman" panose="02020603050405020304" pitchFamily="18" charset="0"/>
+                <a:cs typeface="Times New Roman" panose="02020603050405020304" pitchFamily="18" charset="0"/>
+              </a:rPr>
+              <a:t> : Page</a:t>
+            </a:r>
+          </a:p>
+          <a:p>
+            <a:pPr marL="285750" indent="-285750">
+              <a:buClr>
+                <a:schemeClr val="accent1">
+                  <a:lumMod val="75000"/>
+                </a:schemeClr>
+              </a:buClr>
+              <a:buFont typeface="Arial" panose="020B0604020202020204" pitchFamily="34" charset="0"/>
+              <a:buChar char="•"/>
+            </a:pPr>
+            <a:r>
+              <a:rPr lang="it-IT" sz="1400" dirty="0" err="1">
+                <a:solidFill>
+                  <a:schemeClr val="tx1">
+                    <a:lumMod val="75000"/>
+                    <a:lumOff val="25000"/>
+                  </a:schemeClr>
+                </a:solidFill>
+                <a:latin typeface="Times New Roman" panose="02020603050405020304" pitchFamily="18" charset="0"/>
+                <a:cs typeface="Times New Roman" panose="02020603050405020304" pitchFamily="18" charset="0"/>
+              </a:rPr>
+              <a:t>offersPage</a:t>
+            </a:r>
+            <a:r>
+              <a:rPr lang="it-IT" sz="1400" dirty="0">
+                <a:solidFill>
+                  <a:schemeClr val="tx1">
+                    <a:lumMod val="75000"/>
+                    <a:lumOff val="25000"/>
+                  </a:schemeClr>
+                </a:solidFill>
+                <a:latin typeface="Times New Roman" panose="02020603050405020304" pitchFamily="18" charset="0"/>
+                <a:cs typeface="Times New Roman" panose="02020603050405020304" pitchFamily="18" charset="0"/>
+              </a:rPr>
+              <a:t> : Page</a:t>
+            </a:r>
+          </a:p>
+          <a:p>
+            <a:pPr marL="285750" indent="-285750">
+              <a:buClr>
+                <a:schemeClr val="accent1">
+                  <a:lumMod val="75000"/>
+                </a:schemeClr>
+              </a:buClr>
+              <a:buFont typeface="Arial" panose="020B0604020202020204" pitchFamily="34" charset="0"/>
+              <a:buChar char="•"/>
+            </a:pPr>
+            <a:r>
+              <a:rPr lang="it-IT" sz="1400" dirty="0">
+                <a:solidFill>
+                  <a:schemeClr val="tx1">
+                    <a:lumMod val="75000"/>
+                    <a:lumOff val="25000"/>
+                  </a:schemeClr>
+                </a:solidFill>
+                <a:latin typeface="Times New Roman" panose="02020603050405020304" pitchFamily="18" charset="0"/>
+                <a:cs typeface="Times New Roman" panose="02020603050405020304" pitchFamily="18" charset="0"/>
+              </a:rPr>
+              <a:t>[Page]</a:t>
+            </a:r>
+          </a:p>
+          <a:p>
+            <a:pPr marL="742950" lvl="1" indent="-285750">
+              <a:buClr>
+                <a:schemeClr val="accent1">
+                  <a:lumMod val="75000"/>
+                </a:schemeClr>
+              </a:buClr>
+              <a:buFont typeface="Arial" panose="020B0604020202020204" pitchFamily="34" charset="0"/>
+              <a:buChar char="•"/>
+            </a:pPr>
+            <a:r>
+              <a:rPr lang="it-IT" sz="1200" dirty="0">
+                <a:solidFill>
+                  <a:schemeClr val="tx1">
+                    <a:lumMod val="75000"/>
+                    <a:lumOff val="25000"/>
+                  </a:schemeClr>
+                </a:solidFill>
+                <a:latin typeface="Times New Roman" panose="02020603050405020304" pitchFamily="18" charset="0"/>
+                <a:cs typeface="Times New Roman" panose="02020603050405020304" pitchFamily="18" charset="0"/>
+              </a:rPr>
+              <a:t>create()</a:t>
+            </a:r>
+          </a:p>
+          <a:p>
+            <a:pPr marL="742950" lvl="1" indent="-285750">
+              <a:buClr>
+                <a:schemeClr val="accent1">
+                  <a:lumMod val="75000"/>
+                </a:schemeClr>
+              </a:buClr>
+              <a:buFont typeface="Arial" panose="020B0604020202020204" pitchFamily="34" charset="0"/>
+              <a:buChar char="•"/>
+            </a:pPr>
+            <a:r>
+              <a:rPr lang="it-IT" sz="1200" dirty="0" err="1">
+                <a:solidFill>
+                  <a:schemeClr val="tx1">
+                    <a:lumMod val="75000"/>
+                    <a:lumOff val="25000"/>
+                  </a:schemeClr>
+                </a:solidFill>
+                <a:latin typeface="Times New Roman" panose="02020603050405020304" pitchFamily="18" charset="0"/>
+                <a:cs typeface="Times New Roman" panose="02020603050405020304" pitchFamily="18" charset="0"/>
+              </a:rPr>
+              <a:t>mount</a:t>
+            </a:r>
+            <a:r>
+              <a:rPr lang="it-IT" sz="1200" dirty="0">
+                <a:solidFill>
+                  <a:schemeClr val="tx1">
+                    <a:lumMod val="75000"/>
+                    <a:lumOff val="25000"/>
+                  </a:schemeClr>
+                </a:solidFill>
+                <a:latin typeface="Times New Roman" panose="02020603050405020304" pitchFamily="18" charset="0"/>
+                <a:cs typeface="Times New Roman" panose="02020603050405020304" pitchFamily="18" charset="0"/>
+              </a:rPr>
+              <a:t>(</a:t>
+            </a:r>
+            <a:r>
+              <a:rPr lang="it-IT" sz="1200" dirty="0" err="1">
+                <a:solidFill>
+                  <a:schemeClr val="tx1">
+                    <a:lumMod val="75000"/>
+                    <a:lumOff val="25000"/>
+                  </a:schemeClr>
+                </a:solidFill>
+                <a:latin typeface="Times New Roman" panose="02020603050405020304" pitchFamily="18" charset="0"/>
+                <a:cs typeface="Times New Roman" panose="02020603050405020304" pitchFamily="18" charset="0"/>
+              </a:rPr>
+              <a:t>args</a:t>
+            </a:r>
+            <a:r>
+              <a:rPr lang="it-IT" sz="1200" dirty="0">
+                <a:solidFill>
+                  <a:schemeClr val="tx1">
+                    <a:lumMod val="75000"/>
+                    <a:lumOff val="25000"/>
+                  </a:schemeClr>
+                </a:solidFill>
+                <a:latin typeface="Times New Roman" panose="02020603050405020304" pitchFamily="18" charset="0"/>
+                <a:cs typeface="Times New Roman" panose="02020603050405020304" pitchFamily="18" charset="0"/>
+              </a:rPr>
+              <a:t>: </a:t>
+            </a:r>
+            <a:r>
+              <a:rPr lang="it-IT" sz="1200" dirty="0" err="1">
+                <a:solidFill>
+                  <a:schemeClr val="tx1">
+                    <a:lumMod val="75000"/>
+                    <a:lumOff val="25000"/>
+                  </a:schemeClr>
+                </a:solidFill>
+                <a:latin typeface="Times New Roman" panose="02020603050405020304" pitchFamily="18" charset="0"/>
+                <a:cs typeface="Times New Roman" panose="02020603050405020304" pitchFamily="18" charset="0"/>
+              </a:rPr>
+              <a:t>URLSearchParams</a:t>
+            </a:r>
+            <a:r>
+              <a:rPr lang="it-IT" sz="1200" dirty="0">
+                <a:solidFill>
+                  <a:schemeClr val="tx1">
+                    <a:lumMod val="75000"/>
+                    <a:lumOff val="25000"/>
+                  </a:schemeClr>
+                </a:solidFill>
+                <a:latin typeface="Times New Roman" panose="02020603050405020304" pitchFamily="18" charset="0"/>
+                <a:cs typeface="Times New Roman" panose="02020603050405020304" pitchFamily="18" charset="0"/>
+              </a:rPr>
+              <a:t>)</a:t>
+            </a:r>
+          </a:p>
+          <a:p>
+            <a:pPr marL="742950" lvl="1" indent="-285750">
+              <a:buClr>
+                <a:schemeClr val="accent1">
+                  <a:lumMod val="75000"/>
+                </a:schemeClr>
+              </a:buClr>
+              <a:buFont typeface="Arial" panose="020B0604020202020204" pitchFamily="34" charset="0"/>
+              <a:buChar char="•"/>
+            </a:pPr>
+            <a:r>
+              <a:rPr lang="it-IT" sz="1200" dirty="0" err="1">
+                <a:solidFill>
+                  <a:schemeClr val="tx1">
+                    <a:lumMod val="75000"/>
+                    <a:lumOff val="25000"/>
+                  </a:schemeClr>
+                </a:solidFill>
+                <a:latin typeface="Times New Roman" panose="02020603050405020304" pitchFamily="18" charset="0"/>
+                <a:cs typeface="Times New Roman" panose="02020603050405020304" pitchFamily="18" charset="0"/>
+              </a:rPr>
+              <a:t>unmount</a:t>
+            </a:r>
+            <a:r>
+              <a:rPr lang="it-IT" sz="1200" dirty="0">
+                <a:solidFill>
+                  <a:schemeClr val="tx1">
+                    <a:lumMod val="75000"/>
+                    <a:lumOff val="25000"/>
+                  </a:schemeClr>
+                </a:solidFill>
+                <a:latin typeface="Times New Roman" panose="02020603050405020304" pitchFamily="18" charset="0"/>
+                <a:cs typeface="Times New Roman" panose="02020603050405020304" pitchFamily="18" charset="0"/>
+              </a:rPr>
+              <a:t>()</a:t>
+            </a:r>
+          </a:p>
+          <a:p>
+            <a:pPr marL="285750" indent="-285750">
+              <a:buClr>
+                <a:schemeClr val="accent1">
+                  <a:lumMod val="75000"/>
+                </a:schemeClr>
+              </a:buClr>
+              <a:buFont typeface="Arial" panose="020B0604020202020204" pitchFamily="34" charset="0"/>
+              <a:buChar char="•"/>
+            </a:pPr>
+            <a:endParaRPr lang="it-IT" sz="1400" dirty="0">
+              <a:solidFill>
+                <a:schemeClr val="tx1">
+                  <a:lumMod val="75000"/>
+                  <a:lumOff val="25000"/>
+                </a:schemeClr>
+              </a:solidFill>
+              <a:latin typeface="Times New Roman" panose="02020603050405020304" pitchFamily="18" charset="0"/>
+              <a:cs typeface="Times New Roman" panose="02020603050405020304" pitchFamily="18" charset="0"/>
+            </a:endParaRPr>
+          </a:p>
+          <a:p>
+            <a:pPr marL="285750" indent="-285750">
+              <a:lnSpc>
+                <a:spcPts val="1600"/>
+              </a:lnSpc>
+              <a:buClr>
+                <a:schemeClr val="accent1">
+                  <a:lumMod val="75000"/>
+                </a:schemeClr>
+              </a:buClr>
+              <a:buFont typeface="Arial" panose="020B0604020202020204" pitchFamily="34" charset="0"/>
+              <a:buChar char="•"/>
+            </a:pPr>
+            <a:r>
+              <a:rPr lang="en-US" sz="1400" dirty="0" err="1">
+                <a:solidFill>
+                  <a:schemeClr val="tx1">
+                    <a:lumMod val="75000"/>
+                    <a:lumOff val="25000"/>
+                  </a:schemeClr>
+                </a:solidFill>
+                <a:latin typeface="Times New Roman" panose="02020603050405020304" pitchFamily="18" charset="0"/>
+                <a:cs typeface="Times New Roman" panose="02020603050405020304" pitchFamily="18" charset="0"/>
+              </a:rPr>
+              <a:t>auctionRepository</a:t>
+            </a:r>
+            <a:endParaRPr lang="en-US" sz="1400" dirty="0">
+              <a:solidFill>
+                <a:schemeClr val="tx1">
+                  <a:lumMod val="75000"/>
+                  <a:lumOff val="25000"/>
+                </a:schemeClr>
+              </a:solidFill>
+              <a:latin typeface="Times New Roman" panose="02020603050405020304" pitchFamily="18" charset="0"/>
+              <a:cs typeface="Times New Roman" panose="02020603050405020304" pitchFamily="18" charset="0"/>
+            </a:endParaRPr>
+          </a:p>
+          <a:p>
+            <a:pPr marL="742950" lvl="1" indent="-285750">
+              <a:lnSpc>
+                <a:spcPts val="1600"/>
+              </a:lnSpc>
+              <a:buClr>
+                <a:schemeClr val="accent1">
+                  <a:lumMod val="75000"/>
+                </a:schemeClr>
+              </a:buClr>
+              <a:buFont typeface="Arial" panose="020B0604020202020204" pitchFamily="34" charset="0"/>
+              <a:buChar char="•"/>
+            </a:pPr>
+            <a:r>
+              <a:rPr lang="en-US" sz="1200" dirty="0" err="1">
+                <a:solidFill>
+                  <a:schemeClr val="tx1">
+                    <a:lumMod val="75000"/>
+                    <a:lumOff val="25000"/>
+                  </a:schemeClr>
+                </a:solidFill>
+                <a:latin typeface="Times New Roman" panose="02020603050405020304" pitchFamily="18" charset="0"/>
+                <a:cs typeface="Times New Roman" panose="02020603050405020304" pitchFamily="18" charset="0"/>
+              </a:rPr>
+              <a:t>getOpenAuctionById</a:t>
+            </a:r>
+            <a:r>
+              <a:rPr lang="en-US" sz="1200" dirty="0">
+                <a:solidFill>
+                  <a:schemeClr val="tx1">
+                    <a:lumMod val="75000"/>
+                    <a:lumOff val="25000"/>
+                  </a:schemeClr>
+                </a:solidFill>
+                <a:latin typeface="Times New Roman" panose="02020603050405020304" pitchFamily="18" charset="0"/>
+                <a:cs typeface="Times New Roman" panose="02020603050405020304" pitchFamily="18" charset="0"/>
+              </a:rPr>
+              <a:t>(id)</a:t>
+            </a:r>
+          </a:p>
+          <a:p>
+            <a:pPr marL="742950" lvl="1" indent="-285750">
+              <a:lnSpc>
+                <a:spcPts val="1600"/>
+              </a:lnSpc>
+              <a:buClr>
+                <a:schemeClr val="accent1">
+                  <a:lumMod val="75000"/>
+                </a:schemeClr>
+              </a:buClr>
+              <a:buFont typeface="Arial" panose="020B0604020202020204" pitchFamily="34" charset="0"/>
+              <a:buChar char="•"/>
+            </a:pPr>
+            <a:r>
+              <a:rPr lang="en-US" sz="1200" dirty="0" err="1">
+                <a:solidFill>
+                  <a:schemeClr val="tx1">
+                    <a:lumMod val="75000"/>
+                    <a:lumOff val="25000"/>
+                  </a:schemeClr>
+                </a:solidFill>
+                <a:latin typeface="Times New Roman" panose="02020603050405020304" pitchFamily="18" charset="0"/>
+                <a:cs typeface="Times New Roman" panose="02020603050405020304" pitchFamily="18" charset="0"/>
+              </a:rPr>
+              <a:t>closeAuction</a:t>
+            </a:r>
+            <a:r>
+              <a:rPr lang="en-US" sz="1200" dirty="0">
+                <a:solidFill>
+                  <a:schemeClr val="tx1">
+                    <a:lumMod val="75000"/>
+                    <a:lumOff val="25000"/>
+                  </a:schemeClr>
+                </a:solidFill>
+                <a:latin typeface="Times New Roman" panose="02020603050405020304" pitchFamily="18" charset="0"/>
+                <a:cs typeface="Times New Roman" panose="02020603050405020304" pitchFamily="18" charset="0"/>
+              </a:rPr>
+              <a:t>(</a:t>
+            </a:r>
+            <a:r>
+              <a:rPr lang="en-US" sz="1200" dirty="0" err="1">
+                <a:solidFill>
+                  <a:schemeClr val="tx1">
+                    <a:lumMod val="75000"/>
+                    <a:lumOff val="25000"/>
+                  </a:schemeClr>
+                </a:solidFill>
+                <a:latin typeface="Times New Roman" panose="02020603050405020304" pitchFamily="18" charset="0"/>
+                <a:cs typeface="Times New Roman" panose="02020603050405020304" pitchFamily="18" charset="0"/>
+              </a:rPr>
+              <a:t>FormData</a:t>
+            </a:r>
+            <a:r>
+              <a:rPr lang="en-US" sz="1200" dirty="0">
+                <a:solidFill>
+                  <a:schemeClr val="tx1">
+                    <a:lumMod val="75000"/>
+                    <a:lumOff val="25000"/>
+                  </a:schemeClr>
+                </a:solidFill>
+                <a:latin typeface="Times New Roman" panose="02020603050405020304" pitchFamily="18" charset="0"/>
+                <a:cs typeface="Times New Roman" panose="02020603050405020304" pitchFamily="18" charset="0"/>
+              </a:rPr>
+              <a:t>)</a:t>
+            </a:r>
+          </a:p>
+          <a:p>
+            <a:pPr marL="742950" lvl="1" indent="-285750">
+              <a:lnSpc>
+                <a:spcPts val="1600"/>
+              </a:lnSpc>
+              <a:buClr>
+                <a:schemeClr val="accent1">
+                  <a:lumMod val="75000"/>
+                </a:schemeClr>
+              </a:buClr>
+              <a:buFont typeface="Arial" panose="020B0604020202020204" pitchFamily="34" charset="0"/>
+              <a:buChar char="•"/>
+            </a:pPr>
+            <a:r>
+              <a:rPr lang="en-US" sz="1200" dirty="0" err="1">
+                <a:solidFill>
+                  <a:schemeClr val="tx1">
+                    <a:lumMod val="75000"/>
+                    <a:lumOff val="25000"/>
+                  </a:schemeClr>
+                </a:solidFill>
+                <a:latin typeface="Times New Roman" panose="02020603050405020304" pitchFamily="18" charset="0"/>
+                <a:cs typeface="Times New Roman" panose="02020603050405020304" pitchFamily="18" charset="0"/>
+              </a:rPr>
+              <a:t>getClosedAuction</a:t>
+            </a:r>
+            <a:r>
+              <a:rPr lang="en-US" sz="1200" dirty="0">
+                <a:solidFill>
+                  <a:schemeClr val="tx1">
+                    <a:lumMod val="75000"/>
+                    <a:lumOff val="25000"/>
+                  </a:schemeClr>
+                </a:solidFill>
+                <a:latin typeface="Times New Roman" panose="02020603050405020304" pitchFamily="18" charset="0"/>
+                <a:cs typeface="Times New Roman" panose="02020603050405020304" pitchFamily="18" charset="0"/>
+              </a:rPr>
+              <a:t>()</a:t>
+            </a:r>
+          </a:p>
+          <a:p>
+            <a:pPr marL="742950" lvl="1" indent="-285750">
+              <a:lnSpc>
+                <a:spcPts val="1600"/>
+              </a:lnSpc>
+              <a:buClr>
+                <a:schemeClr val="accent1">
+                  <a:lumMod val="75000"/>
+                </a:schemeClr>
+              </a:buClr>
+              <a:buFont typeface="Arial" panose="020B0604020202020204" pitchFamily="34" charset="0"/>
+              <a:buChar char="•"/>
+            </a:pPr>
+            <a:r>
+              <a:rPr lang="en-US" sz="1200" dirty="0" err="1">
+                <a:solidFill>
+                  <a:schemeClr val="tx1">
+                    <a:lumMod val="75000"/>
+                    <a:lumOff val="25000"/>
+                  </a:schemeClr>
+                </a:solidFill>
+                <a:latin typeface="Times New Roman" panose="02020603050405020304" pitchFamily="18" charset="0"/>
+                <a:cs typeface="Times New Roman" panose="02020603050405020304" pitchFamily="18" charset="0"/>
+              </a:rPr>
+              <a:t>getOpenAuction</a:t>
+            </a:r>
+            <a:r>
+              <a:rPr lang="en-US" sz="1200" dirty="0">
+                <a:solidFill>
+                  <a:schemeClr val="tx1">
+                    <a:lumMod val="75000"/>
+                    <a:lumOff val="25000"/>
+                  </a:schemeClr>
+                </a:solidFill>
+                <a:latin typeface="Times New Roman" panose="02020603050405020304" pitchFamily="18" charset="0"/>
+                <a:cs typeface="Times New Roman" panose="02020603050405020304" pitchFamily="18" charset="0"/>
+              </a:rPr>
+              <a:t>()</a:t>
+            </a:r>
+          </a:p>
+          <a:p>
+            <a:pPr marL="742950" lvl="1" indent="-285750">
+              <a:lnSpc>
+                <a:spcPts val="1600"/>
+              </a:lnSpc>
+              <a:buClr>
+                <a:schemeClr val="accent1">
+                  <a:lumMod val="75000"/>
+                </a:schemeClr>
+              </a:buClr>
+              <a:buFont typeface="Arial" panose="020B0604020202020204" pitchFamily="34" charset="0"/>
+              <a:buChar char="•"/>
+            </a:pPr>
+            <a:r>
+              <a:rPr lang="en-US" sz="1200" dirty="0" err="1">
+                <a:solidFill>
+                  <a:schemeClr val="tx1">
+                    <a:lumMod val="75000"/>
+                    <a:lumOff val="25000"/>
+                  </a:schemeClr>
+                </a:solidFill>
+                <a:latin typeface="Times New Roman" panose="02020603050405020304" pitchFamily="18" charset="0"/>
+                <a:cs typeface="Times New Roman" panose="02020603050405020304" pitchFamily="18" charset="0"/>
+              </a:rPr>
+              <a:t>getAuctionByIds</a:t>
+            </a:r>
+            <a:r>
+              <a:rPr lang="en-US" sz="1200" dirty="0">
+                <a:solidFill>
+                  <a:schemeClr val="tx1">
+                    <a:lumMod val="75000"/>
+                    <a:lumOff val="25000"/>
+                  </a:schemeClr>
+                </a:solidFill>
+                <a:latin typeface="Times New Roman" panose="02020603050405020304" pitchFamily="18" charset="0"/>
+                <a:cs typeface="Times New Roman" panose="02020603050405020304" pitchFamily="18" charset="0"/>
+              </a:rPr>
+              <a:t>(id)</a:t>
+            </a:r>
+          </a:p>
+          <a:p>
+            <a:pPr marL="742950" lvl="1" indent="-285750">
+              <a:lnSpc>
+                <a:spcPts val="1600"/>
+              </a:lnSpc>
+              <a:buClr>
+                <a:schemeClr val="accent1">
+                  <a:lumMod val="75000"/>
+                </a:schemeClr>
+              </a:buClr>
+              <a:buFont typeface="Arial" panose="020B0604020202020204" pitchFamily="34" charset="0"/>
+              <a:buChar char="•"/>
+            </a:pPr>
+            <a:r>
+              <a:rPr lang="en-US" sz="1200" dirty="0" err="1">
+                <a:solidFill>
+                  <a:schemeClr val="tx1">
+                    <a:lumMod val="75000"/>
+                    <a:lumOff val="25000"/>
+                  </a:schemeClr>
+                </a:solidFill>
+                <a:latin typeface="Times New Roman" panose="02020603050405020304" pitchFamily="18" charset="0"/>
+                <a:cs typeface="Times New Roman" panose="02020603050405020304" pitchFamily="18" charset="0"/>
+              </a:rPr>
+              <a:t>insertAuction</a:t>
+            </a:r>
+            <a:r>
+              <a:rPr lang="en-US" sz="1200" dirty="0">
+                <a:solidFill>
+                  <a:schemeClr val="tx1">
+                    <a:lumMod val="75000"/>
+                    <a:lumOff val="25000"/>
+                  </a:schemeClr>
+                </a:solidFill>
+                <a:latin typeface="Times New Roman" panose="02020603050405020304" pitchFamily="18" charset="0"/>
+                <a:cs typeface="Times New Roman" panose="02020603050405020304" pitchFamily="18" charset="0"/>
+              </a:rPr>
+              <a:t>(</a:t>
+            </a:r>
+            <a:r>
+              <a:rPr lang="en-US" sz="1200" dirty="0" err="1">
+                <a:solidFill>
+                  <a:schemeClr val="tx1">
+                    <a:lumMod val="75000"/>
+                    <a:lumOff val="25000"/>
+                  </a:schemeClr>
+                </a:solidFill>
+                <a:latin typeface="Times New Roman" panose="02020603050405020304" pitchFamily="18" charset="0"/>
+                <a:cs typeface="Times New Roman" panose="02020603050405020304" pitchFamily="18" charset="0"/>
+              </a:rPr>
+              <a:t>FormData</a:t>
+            </a:r>
+            <a:r>
+              <a:rPr lang="en-US" sz="1200" dirty="0">
+                <a:solidFill>
+                  <a:schemeClr val="tx1">
+                    <a:lumMod val="75000"/>
+                    <a:lumOff val="25000"/>
+                  </a:schemeClr>
+                </a:solidFill>
+                <a:latin typeface="Times New Roman" panose="02020603050405020304" pitchFamily="18" charset="0"/>
+                <a:cs typeface="Times New Roman" panose="02020603050405020304" pitchFamily="18" charset="0"/>
+              </a:rPr>
+              <a:t>)</a:t>
+            </a:r>
+          </a:p>
+          <a:p>
+            <a:pPr marL="742950" lvl="1" indent="-285750">
+              <a:lnSpc>
+                <a:spcPts val="1600"/>
+              </a:lnSpc>
+              <a:buClr>
+                <a:schemeClr val="accent1">
+                  <a:lumMod val="75000"/>
+                </a:schemeClr>
+              </a:buClr>
+              <a:buFont typeface="Arial" panose="020B0604020202020204" pitchFamily="34" charset="0"/>
+              <a:buChar char="•"/>
+            </a:pPr>
+            <a:r>
+              <a:rPr lang="en-US" sz="1200" dirty="0" err="1">
+                <a:solidFill>
+                  <a:schemeClr val="tx1">
+                    <a:lumMod val="75000"/>
+                    <a:lumOff val="25000"/>
+                  </a:schemeClr>
+                </a:solidFill>
+                <a:latin typeface="Times New Roman" panose="02020603050405020304" pitchFamily="18" charset="0"/>
+                <a:cs typeface="Times New Roman" panose="02020603050405020304" pitchFamily="18" charset="0"/>
+              </a:rPr>
+              <a:t>searchAuction</a:t>
+            </a:r>
+            <a:r>
+              <a:rPr lang="en-US" sz="1200" dirty="0">
+                <a:solidFill>
+                  <a:schemeClr val="tx1">
+                    <a:lumMod val="75000"/>
+                    <a:lumOff val="25000"/>
+                  </a:schemeClr>
+                </a:solidFill>
+                <a:latin typeface="Times New Roman" panose="02020603050405020304" pitchFamily="18" charset="0"/>
+                <a:cs typeface="Times New Roman" panose="02020603050405020304" pitchFamily="18" charset="0"/>
+              </a:rPr>
+              <a:t>(keyword)</a:t>
+            </a:r>
+          </a:p>
+          <a:p>
+            <a:pPr marL="742950" lvl="1" indent="-285750">
+              <a:lnSpc>
+                <a:spcPts val="1600"/>
+              </a:lnSpc>
+              <a:buClr>
+                <a:schemeClr val="accent1">
+                  <a:lumMod val="75000"/>
+                </a:schemeClr>
+              </a:buClr>
+              <a:buFont typeface="Arial" panose="020B0604020202020204" pitchFamily="34" charset="0"/>
+              <a:buChar char="•"/>
+            </a:pPr>
+            <a:r>
+              <a:rPr lang="en-US" sz="1200" dirty="0" err="1">
+                <a:solidFill>
+                  <a:schemeClr val="tx1">
+                    <a:lumMod val="75000"/>
+                    <a:lumOff val="25000"/>
+                  </a:schemeClr>
+                </a:solidFill>
+                <a:latin typeface="Times New Roman" panose="02020603050405020304" pitchFamily="18" charset="0"/>
+                <a:cs typeface="Times New Roman" panose="02020603050405020304" pitchFamily="18" charset="0"/>
+              </a:rPr>
+              <a:t>getBoughtAuctions</a:t>
+            </a:r>
+            <a:r>
+              <a:rPr lang="en-US" sz="1200" dirty="0">
+                <a:solidFill>
+                  <a:schemeClr val="tx1">
+                    <a:lumMod val="75000"/>
+                    <a:lumOff val="25000"/>
+                  </a:schemeClr>
+                </a:solidFill>
+                <a:latin typeface="Times New Roman" panose="02020603050405020304" pitchFamily="18" charset="0"/>
+                <a:cs typeface="Times New Roman" panose="02020603050405020304" pitchFamily="18" charset="0"/>
+              </a:rPr>
+              <a:t>()</a:t>
+            </a:r>
+          </a:p>
+          <a:p>
+            <a:pPr marL="285750" indent="-285750">
+              <a:lnSpc>
+                <a:spcPts val="1600"/>
+              </a:lnSpc>
+              <a:buClr>
+                <a:schemeClr val="accent1">
+                  <a:lumMod val="75000"/>
+                </a:schemeClr>
+              </a:buClr>
+              <a:buFont typeface="Arial" panose="020B0604020202020204" pitchFamily="34" charset="0"/>
+              <a:buChar char="•"/>
+            </a:pPr>
+            <a:r>
+              <a:rPr lang="en-US" sz="1400" dirty="0" err="1">
+                <a:solidFill>
+                  <a:schemeClr val="tx1">
+                    <a:lumMod val="75000"/>
+                    <a:lumOff val="25000"/>
+                  </a:schemeClr>
+                </a:solidFill>
+                <a:latin typeface="Times New Roman" panose="02020603050405020304" pitchFamily="18" charset="0"/>
+                <a:cs typeface="Times New Roman" panose="02020603050405020304" pitchFamily="18" charset="0"/>
+              </a:rPr>
+              <a:t>articleRepository</a:t>
+            </a:r>
+            <a:r>
+              <a:rPr lang="en-US" dirty="0"/>
+              <a:t> </a:t>
+            </a:r>
+          </a:p>
+          <a:p>
+            <a:pPr marL="742950" lvl="1" indent="-285750">
+              <a:lnSpc>
+                <a:spcPts val="1600"/>
+              </a:lnSpc>
+              <a:buClr>
+                <a:schemeClr val="accent1">
+                  <a:lumMod val="75000"/>
+                </a:schemeClr>
+              </a:buClr>
+              <a:buFont typeface="Arial" panose="020B0604020202020204" pitchFamily="34" charset="0"/>
+              <a:buChar char="•"/>
+            </a:pPr>
+            <a:r>
+              <a:rPr lang="en-US" sz="1200" dirty="0" err="1">
+                <a:solidFill>
+                  <a:schemeClr val="tx1">
+                    <a:lumMod val="75000"/>
+                    <a:lumOff val="25000"/>
+                  </a:schemeClr>
+                </a:solidFill>
+                <a:latin typeface="Times New Roman" panose="02020603050405020304" pitchFamily="18" charset="0"/>
+                <a:cs typeface="Times New Roman" panose="02020603050405020304" pitchFamily="18" charset="0"/>
+              </a:rPr>
+              <a:t>findAllArticles</a:t>
+            </a:r>
+            <a:r>
+              <a:rPr lang="en-US" sz="1200" dirty="0">
+                <a:solidFill>
+                  <a:schemeClr val="tx1">
+                    <a:lumMod val="75000"/>
+                    <a:lumOff val="25000"/>
+                  </a:schemeClr>
+                </a:solidFill>
+                <a:latin typeface="Times New Roman" panose="02020603050405020304" pitchFamily="18" charset="0"/>
+                <a:cs typeface="Times New Roman" panose="02020603050405020304" pitchFamily="18" charset="0"/>
+              </a:rPr>
+              <a:t>()</a:t>
+            </a:r>
+          </a:p>
+          <a:p>
+            <a:pPr marL="742950" lvl="1" indent="-285750">
+              <a:lnSpc>
+                <a:spcPts val="1600"/>
+              </a:lnSpc>
+              <a:buClr>
+                <a:schemeClr val="accent1">
+                  <a:lumMod val="75000"/>
+                </a:schemeClr>
+              </a:buClr>
+              <a:buFont typeface="Arial" panose="020B0604020202020204" pitchFamily="34" charset="0"/>
+              <a:buChar char="•"/>
+            </a:pPr>
+            <a:r>
+              <a:rPr lang="en-US" sz="1200" dirty="0" err="1">
+                <a:solidFill>
+                  <a:schemeClr val="tx1">
+                    <a:lumMod val="75000"/>
+                    <a:lumOff val="25000"/>
+                  </a:schemeClr>
+                </a:solidFill>
+                <a:latin typeface="Times New Roman" panose="02020603050405020304" pitchFamily="18" charset="0"/>
+                <a:cs typeface="Times New Roman" panose="02020603050405020304" pitchFamily="18" charset="0"/>
+              </a:rPr>
+              <a:t>insertArticle</a:t>
+            </a:r>
+            <a:r>
+              <a:rPr lang="en-US" sz="1200" dirty="0">
+                <a:solidFill>
+                  <a:schemeClr val="tx1">
+                    <a:lumMod val="75000"/>
+                    <a:lumOff val="25000"/>
+                  </a:schemeClr>
+                </a:solidFill>
+                <a:latin typeface="Times New Roman" panose="02020603050405020304" pitchFamily="18" charset="0"/>
+                <a:cs typeface="Times New Roman" panose="02020603050405020304" pitchFamily="18" charset="0"/>
+              </a:rPr>
+              <a:t>(</a:t>
+            </a:r>
+            <a:r>
+              <a:rPr lang="en-US" sz="1200" dirty="0" err="1">
+                <a:solidFill>
+                  <a:schemeClr val="tx1">
+                    <a:lumMod val="75000"/>
+                    <a:lumOff val="25000"/>
+                  </a:schemeClr>
+                </a:solidFill>
+                <a:latin typeface="Times New Roman" panose="02020603050405020304" pitchFamily="18" charset="0"/>
+                <a:cs typeface="Times New Roman" panose="02020603050405020304" pitchFamily="18" charset="0"/>
+              </a:rPr>
+              <a:t>FormData</a:t>
+            </a:r>
+            <a:r>
+              <a:rPr lang="en-US" sz="1200" dirty="0">
+                <a:solidFill>
+                  <a:schemeClr val="tx1">
+                    <a:lumMod val="75000"/>
+                    <a:lumOff val="25000"/>
+                  </a:schemeClr>
+                </a:solidFill>
+                <a:latin typeface="Times New Roman" panose="02020603050405020304" pitchFamily="18" charset="0"/>
+                <a:cs typeface="Times New Roman" panose="02020603050405020304" pitchFamily="18" charset="0"/>
+              </a:rPr>
+              <a:t>)</a:t>
+            </a:r>
+          </a:p>
+          <a:p>
+            <a:pPr marL="285750" indent="-285750">
+              <a:lnSpc>
+                <a:spcPts val="1600"/>
+              </a:lnSpc>
+              <a:buClr>
+                <a:schemeClr val="accent1">
+                  <a:lumMod val="75000"/>
+                </a:schemeClr>
+              </a:buClr>
+              <a:buFont typeface="Arial" panose="020B0604020202020204" pitchFamily="34" charset="0"/>
+              <a:buChar char="•"/>
+            </a:pPr>
+            <a:r>
+              <a:rPr lang="en-US" sz="1400" dirty="0" err="1">
+                <a:solidFill>
+                  <a:schemeClr val="tx1">
+                    <a:lumMod val="75000"/>
+                    <a:lumOff val="25000"/>
+                  </a:schemeClr>
+                </a:solidFill>
+                <a:latin typeface="Times New Roman" panose="02020603050405020304" pitchFamily="18" charset="0"/>
+                <a:cs typeface="Times New Roman" panose="02020603050405020304" pitchFamily="18" charset="0"/>
+              </a:rPr>
+              <a:t>offerRepository</a:t>
+            </a:r>
+            <a:r>
+              <a:rPr lang="en-US" dirty="0"/>
+              <a:t> </a:t>
+            </a:r>
+          </a:p>
+          <a:p>
+            <a:pPr marL="742950" lvl="1" indent="-285750">
+              <a:lnSpc>
+                <a:spcPts val="1600"/>
+              </a:lnSpc>
+              <a:buClr>
+                <a:schemeClr val="accent1">
+                  <a:lumMod val="75000"/>
+                </a:schemeClr>
+              </a:buClr>
+              <a:buFont typeface="Arial" panose="020B0604020202020204" pitchFamily="34" charset="0"/>
+              <a:buChar char="•"/>
+            </a:pPr>
+            <a:r>
+              <a:rPr lang="en-US" sz="1200" dirty="0" err="1">
+                <a:solidFill>
+                  <a:schemeClr val="tx1">
+                    <a:lumMod val="75000"/>
+                    <a:lumOff val="25000"/>
+                  </a:schemeClr>
+                </a:solidFill>
+                <a:latin typeface="Times New Roman" panose="02020603050405020304" pitchFamily="18" charset="0"/>
+                <a:cs typeface="Times New Roman" panose="02020603050405020304" pitchFamily="18" charset="0"/>
+              </a:rPr>
+              <a:t>insertOffer</a:t>
+            </a:r>
+            <a:r>
+              <a:rPr lang="en-US" sz="1200" dirty="0">
+                <a:solidFill>
+                  <a:schemeClr val="tx1">
+                    <a:lumMod val="75000"/>
+                    <a:lumOff val="25000"/>
+                  </a:schemeClr>
+                </a:solidFill>
+                <a:latin typeface="Times New Roman" panose="02020603050405020304" pitchFamily="18" charset="0"/>
+                <a:cs typeface="Times New Roman" panose="02020603050405020304" pitchFamily="18" charset="0"/>
+              </a:rPr>
+              <a:t>(</a:t>
+            </a:r>
+            <a:r>
+              <a:rPr lang="en-US" sz="1200" dirty="0" err="1">
+                <a:solidFill>
+                  <a:schemeClr val="tx1">
+                    <a:lumMod val="75000"/>
+                    <a:lumOff val="25000"/>
+                  </a:schemeClr>
+                </a:solidFill>
+                <a:latin typeface="Times New Roman" panose="02020603050405020304" pitchFamily="18" charset="0"/>
+                <a:cs typeface="Times New Roman" panose="02020603050405020304" pitchFamily="18" charset="0"/>
+              </a:rPr>
+              <a:t>FormData</a:t>
+            </a:r>
+            <a:r>
+              <a:rPr lang="en-US" sz="1200" dirty="0">
+                <a:solidFill>
+                  <a:schemeClr val="tx1">
+                    <a:lumMod val="75000"/>
+                    <a:lumOff val="25000"/>
+                  </a:schemeClr>
+                </a:solidFill>
+                <a:latin typeface="Times New Roman" panose="02020603050405020304" pitchFamily="18" charset="0"/>
+                <a:cs typeface="Times New Roman" panose="02020603050405020304" pitchFamily="18" charset="0"/>
+              </a:rPr>
+              <a:t>)</a:t>
+            </a:r>
+          </a:p>
+          <a:p>
+            <a:pPr marL="285750" indent="-285750">
+              <a:buClr>
+                <a:schemeClr val="accent1">
+                  <a:lumMod val="75000"/>
+                </a:schemeClr>
+              </a:buClr>
+              <a:buFont typeface="Arial" panose="020B0604020202020204" pitchFamily="34" charset="0"/>
+              <a:buChar char="•"/>
+            </a:pPr>
             <a:endParaRPr lang="en-US" dirty="0"/>
           </a:p>
         </p:txBody>

</xml_diff>